<commit_message>
fixed typo in input file template
</commit_message>
<xml_diff>
--- a/Tamil_Nadu_Two_Dose/CEACOV_Two_Dose_Flowchart.pptx
+++ b/Tamil_Nadu_Two_Dose/CEACOV_Two_Dose_Flowchart.pptx
@@ -259,7 +259,7 @@
           <a:p>
             <a:fld id="{241A0DBC-1164-4984-A19D-761A400D5B3E}" type="datetimeFigureOut">
               <a:rPr lang="en-US" smtClean="0"/>
-              <a:t>6/21/2021</a:t>
+              <a:t>6/23/2021</a:t>
             </a:fld>
             <a:endParaRPr lang="en-US"/>
           </a:p>
@@ -457,7 +457,7 @@
           <a:p>
             <a:fld id="{241A0DBC-1164-4984-A19D-761A400D5B3E}" type="datetimeFigureOut">
               <a:rPr lang="en-US" smtClean="0"/>
-              <a:t>6/21/2021</a:t>
+              <a:t>6/23/2021</a:t>
             </a:fld>
             <a:endParaRPr lang="en-US"/>
           </a:p>
@@ -665,7 +665,7 @@
           <a:p>
             <a:fld id="{241A0DBC-1164-4984-A19D-761A400D5B3E}" type="datetimeFigureOut">
               <a:rPr lang="en-US" smtClean="0"/>
-              <a:t>6/21/2021</a:t>
+              <a:t>6/23/2021</a:t>
             </a:fld>
             <a:endParaRPr lang="en-US"/>
           </a:p>
@@ -863,7 +863,7 @@
           <a:p>
             <a:fld id="{241A0DBC-1164-4984-A19D-761A400D5B3E}" type="datetimeFigureOut">
               <a:rPr lang="en-US" smtClean="0"/>
-              <a:t>6/21/2021</a:t>
+              <a:t>6/23/2021</a:t>
             </a:fld>
             <a:endParaRPr lang="en-US"/>
           </a:p>
@@ -1138,7 +1138,7 @@
           <a:p>
             <a:fld id="{241A0DBC-1164-4984-A19D-761A400D5B3E}" type="datetimeFigureOut">
               <a:rPr lang="en-US" smtClean="0"/>
-              <a:t>6/21/2021</a:t>
+              <a:t>6/23/2021</a:t>
             </a:fld>
             <a:endParaRPr lang="en-US"/>
           </a:p>
@@ -1403,7 +1403,7 @@
           <a:p>
             <a:fld id="{241A0DBC-1164-4984-A19D-761A400D5B3E}" type="datetimeFigureOut">
               <a:rPr lang="en-US" smtClean="0"/>
-              <a:t>6/21/2021</a:t>
+              <a:t>6/23/2021</a:t>
             </a:fld>
             <a:endParaRPr lang="en-US"/>
           </a:p>
@@ -1815,7 +1815,7 @@
           <a:p>
             <a:fld id="{241A0DBC-1164-4984-A19D-761A400D5B3E}" type="datetimeFigureOut">
               <a:rPr lang="en-US" smtClean="0"/>
-              <a:t>6/21/2021</a:t>
+              <a:t>6/23/2021</a:t>
             </a:fld>
             <a:endParaRPr lang="en-US"/>
           </a:p>
@@ -1956,7 +1956,7 @@
           <a:p>
             <a:fld id="{241A0DBC-1164-4984-A19D-761A400D5B3E}" type="datetimeFigureOut">
               <a:rPr lang="en-US" smtClean="0"/>
-              <a:t>6/21/2021</a:t>
+              <a:t>6/23/2021</a:t>
             </a:fld>
             <a:endParaRPr lang="en-US"/>
           </a:p>
@@ -2069,7 +2069,7 @@
           <a:p>
             <a:fld id="{241A0DBC-1164-4984-A19D-761A400D5B3E}" type="datetimeFigureOut">
               <a:rPr lang="en-US" smtClean="0"/>
-              <a:t>6/21/2021</a:t>
+              <a:t>6/23/2021</a:t>
             </a:fld>
             <a:endParaRPr lang="en-US"/>
           </a:p>
@@ -2380,7 +2380,7 @@
           <a:p>
             <a:fld id="{241A0DBC-1164-4984-A19D-761A400D5B3E}" type="datetimeFigureOut">
               <a:rPr lang="en-US" smtClean="0"/>
-              <a:t>6/21/2021</a:t>
+              <a:t>6/23/2021</a:t>
             </a:fld>
             <a:endParaRPr lang="en-US"/>
           </a:p>
@@ -2668,7 +2668,7 @@
           <a:p>
             <a:fld id="{241A0DBC-1164-4984-A19D-761A400D5B3E}" type="datetimeFigureOut">
               <a:rPr lang="en-US" smtClean="0"/>
-              <a:t>6/21/2021</a:t>
+              <a:t>6/23/2021</a:t>
             </a:fld>
             <a:endParaRPr lang="en-US"/>
           </a:p>
@@ -2909,7 +2909,7 @@
           <a:p>
             <a:fld id="{241A0DBC-1164-4984-A19D-761A400D5B3E}" type="datetimeFigureOut">
               <a:rPr lang="en-US" smtClean="0"/>
-              <a:t>6/21/2021</a:t>
+              <a:t>6/23/2021</a:t>
             </a:fld>
             <a:endParaRPr lang="en-US"/>
           </a:p>
@@ -8949,6 +8949,134 @@
           </a:p>
         </p:txBody>
       </p:sp>
+      <p:sp>
+        <p:nvSpPr>
+          <p:cNvPr id="101" name="Right Brace 100">
+            <a:extLst>
+              <a:ext uri="{FF2B5EF4-FFF2-40B4-BE49-F238E27FC236}">
+                <a16:creationId xmlns:a16="http://schemas.microsoft.com/office/drawing/2014/main" id="{93625989-9154-4E55-9DCB-20D7407D5D41}"/>
+              </a:ext>
+            </a:extLst>
+          </p:cNvPr>
+          <p:cNvSpPr/>
+          <p:nvPr/>
+        </p:nvSpPr>
+        <p:spPr>
+          <a:xfrm>
+            <a:off x="9980866" y="4409701"/>
+            <a:ext cx="222255" cy="583922"/>
+          </a:xfrm>
+          <a:prstGeom prst="rightBrace">
+            <a:avLst/>
+          </a:prstGeom>
+          <a:ln w="19050">
+            <a:solidFill>
+              <a:schemeClr val="tx1"/>
+            </a:solidFill>
+          </a:ln>
+        </p:spPr>
+        <p:style>
+          <a:lnRef idx="1">
+            <a:schemeClr val="accent1"/>
+          </a:lnRef>
+          <a:fillRef idx="0">
+            <a:schemeClr val="accent1"/>
+          </a:fillRef>
+          <a:effectRef idx="0">
+            <a:schemeClr val="accent1"/>
+          </a:effectRef>
+          <a:fontRef idx="minor">
+            <a:schemeClr val="tx1"/>
+          </a:fontRef>
+        </p:style>
+        <p:txBody>
+          <a:bodyPr rtlCol="0" anchor="ctr"/>
+          <a:lstStyle/>
+          <a:p>
+            <a:pPr algn="ctr"/>
+            <a:endParaRPr lang="en-US"/>
+          </a:p>
+        </p:txBody>
+      </p:sp>
+      <p:sp>
+        <p:nvSpPr>
+          <p:cNvPr id="103" name="Rectangle: Rounded Corners 102">
+            <a:extLst>
+              <a:ext uri="{FF2B5EF4-FFF2-40B4-BE49-F238E27FC236}">
+                <a16:creationId xmlns:a16="http://schemas.microsoft.com/office/drawing/2014/main" id="{8A140200-CC02-4F7D-BEB3-6E60FCE45A7C}"/>
+              </a:ext>
+            </a:extLst>
+          </p:cNvPr>
+          <p:cNvSpPr/>
+          <p:nvPr/>
+        </p:nvSpPr>
+        <p:spPr>
+          <a:xfrm>
+            <a:off x="10214715" y="4480520"/>
+            <a:ext cx="1781493" cy="451802"/>
+          </a:xfrm>
+          <a:prstGeom prst="roundRect">
+            <a:avLst/>
+          </a:prstGeom>
+          <a:noFill/>
+          <a:ln>
+            <a:noFill/>
+          </a:ln>
+        </p:spPr>
+        <p:style>
+          <a:lnRef idx="2">
+            <a:schemeClr val="accent1">
+              <a:shade val="50000"/>
+            </a:schemeClr>
+          </a:lnRef>
+          <a:fillRef idx="1">
+            <a:schemeClr val="accent1"/>
+          </a:fillRef>
+          <a:effectRef idx="0">
+            <a:schemeClr val="accent1"/>
+          </a:effectRef>
+          <a:fontRef idx="minor">
+            <a:schemeClr val="lt1"/>
+          </a:fontRef>
+        </p:style>
+        <p:txBody>
+          <a:bodyPr rtlCol="0" anchor="ctr"/>
+          <a:lstStyle/>
+          <a:p>
+            <a:pPr algn="ctr"/>
+            <a:r>
+              <a:rPr lang="en-US" sz="1200" dirty="0">
+                <a:solidFill>
+                  <a:schemeClr val="tx1"/>
+                </a:solidFill>
+                <a:latin typeface="Cambria Math" panose="02040503050406030204" pitchFamily="18" charset="0"/>
+                <a:ea typeface="Cambria Math" panose="02040503050406030204" pitchFamily="18" charset="0"/>
+              </a:rPr>
+              <a:t>Starting intervention for </a:t>
+            </a:r>
+            <a:r>
+              <a:rPr lang="en-US" sz="1200" dirty="0" err="1">
+                <a:solidFill>
+                  <a:schemeClr val="tx1"/>
+                </a:solidFill>
+                <a:latin typeface="Cambria Math" panose="02040503050406030204" pitchFamily="18" charset="0"/>
+                <a:ea typeface="Cambria Math" panose="02040503050406030204" pitchFamily="18" charset="0"/>
+              </a:rPr>
+              <a:t>tn_group</a:t>
+            </a:r>
+            <a:r>
+              <a:rPr lang="en-US" sz="1200" dirty="0">
+                <a:solidFill>
+                  <a:schemeClr val="tx1"/>
+                </a:solidFill>
+                <a:latin typeface="Cambria Math" panose="02040503050406030204" pitchFamily="18" charset="0"/>
+                <a:ea typeface="Cambria Math" panose="02040503050406030204" pitchFamily="18" charset="0"/>
+              </a:rPr>
+              <a:t> 3 (all vaccinated individuals)</a:t>
+            </a:r>
+          </a:p>
+        </p:txBody>
+      </p:sp>
     </p:spTree>
     <p:extLst>
       <p:ext uri="{BB962C8B-B14F-4D97-AF65-F5344CB8AC3E}">

</xml_diff>